<commit_message>
Creation of a file and directory list documented
</commit_message>
<xml_diff>
--- a/Description/UtilFilesUtilUrl.pptx
+++ b/Description/UtilFilesUtilUrl.pptx
@@ -272,7 +272,7 @@
           <a:p>
             <a:fld id="{DDCE6D58-9B57-4731-A47B-3CD41B48F0A9}" type="datetimeFigureOut">
               <a:rPr lang="de-CH" smtClean="0"/>
-              <a:t>15.01.2025</a:t>
+              <a:t>19.01.2025</a:t>
             </a:fld>
             <a:endParaRPr lang="de-CH"/>
           </a:p>
@@ -442,7 +442,7 @@
           <a:p>
             <a:fld id="{DDCE6D58-9B57-4731-A47B-3CD41B48F0A9}" type="datetimeFigureOut">
               <a:rPr lang="de-CH" smtClean="0"/>
-              <a:t>15.01.2025</a:t>
+              <a:t>19.01.2025</a:t>
             </a:fld>
             <a:endParaRPr lang="de-CH"/>
           </a:p>
@@ -622,7 +622,7 @@
           <a:p>
             <a:fld id="{DDCE6D58-9B57-4731-A47B-3CD41B48F0A9}" type="datetimeFigureOut">
               <a:rPr lang="de-CH" smtClean="0"/>
-              <a:t>15.01.2025</a:t>
+              <a:t>19.01.2025</a:t>
             </a:fld>
             <a:endParaRPr lang="de-CH"/>
           </a:p>
@@ -792,7 +792,7 @@
           <a:p>
             <a:fld id="{DDCE6D58-9B57-4731-A47B-3CD41B48F0A9}" type="datetimeFigureOut">
               <a:rPr lang="de-CH" smtClean="0"/>
-              <a:t>15.01.2025</a:t>
+              <a:t>19.01.2025</a:t>
             </a:fld>
             <a:endParaRPr lang="de-CH"/>
           </a:p>
@@ -1038,7 +1038,7 @@
           <a:p>
             <a:fld id="{DDCE6D58-9B57-4731-A47B-3CD41B48F0A9}" type="datetimeFigureOut">
               <a:rPr lang="de-CH" smtClean="0"/>
-              <a:t>15.01.2025</a:t>
+              <a:t>19.01.2025</a:t>
             </a:fld>
             <a:endParaRPr lang="de-CH"/>
           </a:p>
@@ -1270,7 +1270,7 @@
           <a:p>
             <a:fld id="{DDCE6D58-9B57-4731-A47B-3CD41B48F0A9}" type="datetimeFigureOut">
               <a:rPr lang="de-CH" smtClean="0"/>
-              <a:t>15.01.2025</a:t>
+              <a:t>19.01.2025</a:t>
             </a:fld>
             <a:endParaRPr lang="de-CH"/>
           </a:p>
@@ -1637,7 +1637,7 @@
           <a:p>
             <a:fld id="{DDCE6D58-9B57-4731-A47B-3CD41B48F0A9}" type="datetimeFigureOut">
               <a:rPr lang="de-CH" smtClean="0"/>
-              <a:t>15.01.2025</a:t>
+              <a:t>19.01.2025</a:t>
             </a:fld>
             <a:endParaRPr lang="de-CH"/>
           </a:p>
@@ -1755,7 +1755,7 @@
           <a:p>
             <a:fld id="{DDCE6D58-9B57-4731-A47B-3CD41B48F0A9}" type="datetimeFigureOut">
               <a:rPr lang="de-CH" smtClean="0"/>
-              <a:t>15.01.2025</a:t>
+              <a:t>19.01.2025</a:t>
             </a:fld>
             <a:endParaRPr lang="de-CH"/>
           </a:p>
@@ -1850,7 +1850,7 @@
           <a:p>
             <a:fld id="{DDCE6D58-9B57-4731-A47B-3CD41B48F0A9}" type="datetimeFigureOut">
               <a:rPr lang="de-CH" smtClean="0"/>
-              <a:t>15.01.2025</a:t>
+              <a:t>19.01.2025</a:t>
             </a:fld>
             <a:endParaRPr lang="de-CH"/>
           </a:p>
@@ -2127,7 +2127,7 @@
           <a:p>
             <a:fld id="{DDCE6D58-9B57-4731-A47B-3CD41B48F0A9}" type="datetimeFigureOut">
               <a:rPr lang="de-CH" smtClean="0"/>
-              <a:t>15.01.2025</a:t>
+              <a:t>19.01.2025</a:t>
             </a:fld>
             <a:endParaRPr lang="de-CH"/>
           </a:p>
@@ -2380,7 +2380,7 @@
           <a:p>
             <a:fld id="{DDCE6D58-9B57-4731-A47B-3CD41B48F0A9}" type="datetimeFigureOut">
               <a:rPr lang="de-CH" smtClean="0"/>
-              <a:t>15.01.2025</a:t>
+              <a:t>19.01.2025</a:t>
             </a:fld>
             <a:endParaRPr lang="de-CH"/>
           </a:p>
@@ -2593,7 +2593,7 @@
           <a:p>
             <a:fld id="{DDCE6D58-9B57-4731-A47B-3CD41B48F0A9}" type="datetimeFigureOut">
               <a:rPr lang="de-CH" smtClean="0"/>
-              <a:t>15.01.2025</a:t>
+              <a:t>19.01.2025</a:t>
             </a:fld>
             <a:endParaRPr lang="de-CH"/>
           </a:p>
@@ -4132,7 +4132,7 @@
         <p:spPr>
           <a:xfrm>
             <a:off x="3769323" y="2718210"/>
-            <a:ext cx="2724345" cy="322107"/>
+            <a:ext cx="2724345" cy="349948"/>
           </a:xfrm>
           <a:prstGeom prst="rect">
             <a:avLst/>
@@ -4173,8 +4173,11 @@
                 <a:latin typeface="Arial" panose="020B0604020202020204" pitchFamily="34" charset="0"/>
                 <a:cs typeface="Arial" panose="020B0604020202020204" pitchFamily="34" charset="0"/>
               </a:rPr>
-              <a:t>Set PHP file name to </a:t>
-            </a:r>
+              <a:t>Convert input relative URL to absolute URLs</a:t>
+            </a:r>
+          </a:p>
+          <a:p>
+            <a:pPr algn="ctr"/>
             <a:r>
               <a:rPr lang="en-US" sz="900" b="1" dirty="0" err="1">
                 <a:solidFill>
@@ -4183,7 +4186,7 @@
                 <a:latin typeface="Arial" panose="020B0604020202020204" pitchFamily="34" charset="0"/>
                 <a:cs typeface="Arial" panose="020B0604020202020204" pitchFamily="34" charset="0"/>
               </a:rPr>
-              <a:t>UtilFiles.php</a:t>
+              <a:t>allFilesDirectoriesToAbsoluteUrl</a:t>
             </a:r>
             <a:endParaRPr lang="en-US" sz="900" b="1" dirty="0">
               <a:solidFill>
@@ -4209,7 +4212,7 @@
         </p:nvSpPr>
         <p:spPr>
           <a:xfrm>
-            <a:off x="3789264" y="3314057"/>
+            <a:off x="3769323" y="3356147"/>
             <a:ext cx="2712430" cy="322107"/>
           </a:xfrm>
           <a:prstGeom prst="rect">
@@ -4251,8 +4254,28 @@
                 <a:latin typeface="Arial" panose="020B0604020202020204" pitchFamily="34" charset="0"/>
                 <a:cs typeface="Arial" panose="020B0604020202020204" pitchFamily="34" charset="0"/>
               </a:rPr>
-              <a:t>Convert PHP directory to relative URL if needed </a:t>
-            </a:r>
+              <a:t>Convert all absolute URLs to relative URLs</a:t>
+            </a:r>
+          </a:p>
+          <a:p>
+            <a:pPr algn="ctr"/>
+            <a:r>
+              <a:rPr lang="en-US" sz="900" b="1" dirty="0" err="1">
+                <a:solidFill>
+                  <a:schemeClr val="tx1"/>
+                </a:solidFill>
+                <a:latin typeface="Arial" panose="020B0604020202020204" pitchFamily="34" charset="0"/>
+                <a:cs typeface="Arial" panose="020B0604020202020204" pitchFamily="34" charset="0"/>
+              </a:rPr>
+              <a:t>allFilesDirectoriesRelativePhpAndHtml</a:t>
+            </a:r>
+            <a:endParaRPr lang="en-US" sz="900" b="1" dirty="0">
+              <a:solidFill>
+                <a:schemeClr val="tx1"/>
+              </a:solidFill>
+              <a:latin typeface="Arial" panose="020B0604020202020204" pitchFamily="34" charset="0"/>
+              <a:cs typeface="Arial" panose="020B0604020202020204" pitchFamily="34" charset="0"/>
+            </a:endParaRPr>
           </a:p>
         </p:txBody>
       </p:sp>
@@ -4270,7 +4293,7 @@
         </p:nvSpPr>
         <p:spPr>
           <a:xfrm>
-            <a:off x="3792918" y="3897569"/>
+            <a:off x="3782001" y="3966243"/>
             <a:ext cx="2724345" cy="499547"/>
           </a:xfrm>
           <a:prstGeom prst="rect">
@@ -4371,7 +4394,7 @@
         </p:nvCxnSpPr>
         <p:spPr>
           <a:xfrm flipH="1">
-            <a:off x="5110780" y="3627745"/>
+            <a:off x="5099863" y="3696419"/>
             <a:ext cx="9427" cy="269824"/>
           </a:xfrm>
           <a:prstGeom prst="line">
@@ -4412,7 +4435,7 @@
         </p:nvCxnSpPr>
         <p:spPr>
           <a:xfrm flipH="1">
-            <a:off x="5120207" y="3026070"/>
+            <a:off x="5100266" y="3068160"/>
             <a:ext cx="9427" cy="269824"/>
           </a:xfrm>
           <a:prstGeom prst="line">
@@ -4453,7 +4476,7 @@
         </p:nvSpPr>
         <p:spPr>
           <a:xfrm>
-            <a:off x="3789575" y="4637574"/>
+            <a:off x="3778658" y="4706248"/>
             <a:ext cx="2724345" cy="499547"/>
           </a:xfrm>
           <a:prstGeom prst="rect">
@@ -4544,7 +4567,7 @@
         </p:nvCxnSpPr>
         <p:spPr>
           <a:xfrm flipH="1">
-            <a:off x="5107437" y="4367750"/>
+            <a:off x="5096520" y="4436424"/>
             <a:ext cx="9427" cy="269824"/>
           </a:xfrm>
           <a:prstGeom prst="line">
@@ -4585,8 +4608,8 @@
         </p:nvSpPr>
         <p:spPr>
           <a:xfrm>
-            <a:off x="3669928" y="2280746"/>
-            <a:ext cx="2966541" cy="3005957"/>
+            <a:off x="3657559" y="2194986"/>
+            <a:ext cx="2966541" cy="3254243"/>
           </a:xfrm>
           <a:prstGeom prst="rect">
             <a:avLst/>
@@ -4649,6 +4672,24 @@
               </a:rPr>
               <a:t>dirFileAnyCase</a:t>
             </a:r>
+            <a:endParaRPr lang="de-CH" sz="1200" b="1" dirty="0">
+              <a:solidFill>
+                <a:schemeClr val="tx1"/>
+              </a:solidFill>
+              <a:latin typeface="Arial" panose="020B0604020202020204" pitchFamily="34" charset="0"/>
+              <a:cs typeface="Arial" panose="020B0604020202020204" pitchFamily="34" charset="0"/>
+            </a:endParaRPr>
+          </a:p>
+          <a:p>
+            <a:endParaRPr lang="de-CH" sz="1200" b="1" dirty="0">
+              <a:solidFill>
+                <a:schemeClr val="tx1"/>
+              </a:solidFill>
+              <a:latin typeface="Arial" panose="020B0604020202020204" pitchFamily="34" charset="0"/>
+              <a:cs typeface="Arial" panose="020B0604020202020204" pitchFamily="34" charset="0"/>
+            </a:endParaRPr>
+          </a:p>
+          <a:p>
             <a:endParaRPr lang="de-CH" sz="1200" b="1" dirty="0">
               <a:solidFill>
                 <a:schemeClr val="tx1"/>
@@ -10013,6 +10054,1906 @@
           <a:chExt cx="0" cy="0"/>
         </a:xfrm>
       </p:grpSpPr>
+      <p:sp>
+        <p:nvSpPr>
+          <p:cNvPr id="2" name="Rechteck 1">
+            <a:extLst>
+              <a:ext uri="{FF2B5EF4-FFF2-40B4-BE49-F238E27FC236}">
+                <a16:creationId xmlns:a16="http://schemas.microsoft.com/office/drawing/2014/main" id="{CEFB2958-D42F-85C6-F97F-8686C4DCE354}"/>
+              </a:ext>
+            </a:extLst>
+          </p:cNvPr>
+          <p:cNvSpPr/>
+          <p:nvPr/>
+        </p:nvSpPr>
+        <p:spPr>
+          <a:xfrm>
+            <a:off x="3769323" y="453503"/>
+            <a:ext cx="2724345" cy="404094"/>
+          </a:xfrm>
+          <a:prstGeom prst="rect">
+            <a:avLst/>
+          </a:prstGeom>
+          <a:noFill/>
+          <a:ln w="19050">
+            <a:solidFill>
+              <a:schemeClr val="tx1"/>
+            </a:solidFill>
+          </a:ln>
+        </p:spPr>
+        <p:style>
+          <a:lnRef idx="2">
+            <a:schemeClr val="accent1">
+              <a:shade val="50000"/>
+            </a:schemeClr>
+          </a:lnRef>
+          <a:fillRef idx="1">
+            <a:schemeClr val="accent1"/>
+          </a:fillRef>
+          <a:effectRef idx="0">
+            <a:schemeClr val="accent1"/>
+          </a:effectRef>
+          <a:fontRef idx="minor">
+            <a:schemeClr val="lt1"/>
+          </a:fontRef>
+        </p:style>
+        <p:txBody>
+          <a:bodyPr rtlCol="0" anchor="ctr"/>
+          <a:lstStyle/>
+          <a:p>
+            <a:pPr algn="ctr"/>
+            <a:r>
+              <a:rPr lang="en-US" sz="900" b="1" dirty="0">
+                <a:solidFill>
+                  <a:schemeClr val="tx1"/>
+                </a:solidFill>
+                <a:latin typeface="Arial" panose="020B0604020202020204" pitchFamily="34" charset="0"/>
+                <a:cs typeface="Arial" panose="020B0604020202020204" pitchFamily="34" charset="0"/>
+              </a:rPr>
+              <a:t>Set callback-chain array</a:t>
+            </a:r>
+          </a:p>
+          <a:p>
+            <a:pPr algn="ctr"/>
+            <a:r>
+              <a:rPr lang="en-US" sz="900" b="1" dirty="0" err="1">
+                <a:solidFill>
+                  <a:schemeClr val="tx1"/>
+                </a:solidFill>
+                <a:latin typeface="Arial" panose="020B0604020202020204" pitchFamily="34" charset="0"/>
+                <a:cs typeface="Arial" panose="020B0604020202020204" pitchFamily="34" charset="0"/>
+              </a:rPr>
+              <a:t>UtilFiles.getDirFileNames</a:t>
+            </a:r>
+            <a:endParaRPr lang="en-US" sz="900" b="1" dirty="0">
+              <a:solidFill>
+                <a:schemeClr val="tx1"/>
+              </a:solidFill>
+              <a:latin typeface="Arial" panose="020B0604020202020204" pitchFamily="34" charset="0"/>
+              <a:cs typeface="Arial" panose="020B0604020202020204" pitchFamily="34" charset="0"/>
+            </a:endParaRPr>
+          </a:p>
+        </p:txBody>
+      </p:sp>
+      <p:sp>
+        <p:nvSpPr>
+          <p:cNvPr id="3" name="Rechteck 2">
+            <a:extLst>
+              <a:ext uri="{FF2B5EF4-FFF2-40B4-BE49-F238E27FC236}">
+                <a16:creationId xmlns:a16="http://schemas.microsoft.com/office/drawing/2014/main" id="{9FCC7ABC-A19A-1221-E029-4D989AD46834}"/>
+              </a:ext>
+            </a:extLst>
+          </p:cNvPr>
+          <p:cNvSpPr/>
+          <p:nvPr/>
+        </p:nvSpPr>
+        <p:spPr>
+          <a:xfrm>
+            <a:off x="3777895" y="1113107"/>
+            <a:ext cx="2712430" cy="354586"/>
+          </a:xfrm>
+          <a:prstGeom prst="rect">
+            <a:avLst/>
+          </a:prstGeom>
+          <a:noFill/>
+          <a:ln w="19050">
+            <a:solidFill>
+              <a:schemeClr val="tx1"/>
+            </a:solidFill>
+          </a:ln>
+        </p:spPr>
+        <p:style>
+          <a:lnRef idx="2">
+            <a:schemeClr val="accent1">
+              <a:shade val="50000"/>
+            </a:schemeClr>
+          </a:lnRef>
+          <a:fillRef idx="1">
+            <a:schemeClr val="accent1"/>
+          </a:fillRef>
+          <a:effectRef idx="0">
+            <a:schemeClr val="accent1"/>
+          </a:effectRef>
+          <a:fontRef idx="minor">
+            <a:schemeClr val="lt1"/>
+          </a:fontRef>
+        </p:style>
+        <p:txBody>
+          <a:bodyPr rtlCol="0" anchor="ctr"/>
+          <a:lstStyle/>
+          <a:p>
+            <a:pPr algn="ctr"/>
+            <a:r>
+              <a:rPr lang="en-US" sz="900" b="1" dirty="0">
+                <a:solidFill>
+                  <a:schemeClr val="tx1"/>
+                </a:solidFill>
+                <a:latin typeface="Arial" panose="020B0604020202020204" pitchFamily="34" charset="0"/>
+                <a:cs typeface="Arial" panose="020B0604020202020204" pitchFamily="34" charset="0"/>
+              </a:rPr>
+              <a:t>Create directory and XML file with file names.</a:t>
+            </a:r>
+          </a:p>
+          <a:p>
+            <a:pPr algn="ctr"/>
+            <a:r>
+              <a:rPr lang="en-US" sz="900" b="1" dirty="0" err="1">
+                <a:solidFill>
+                  <a:schemeClr val="tx1"/>
+                </a:solidFill>
+                <a:latin typeface="Arial" panose="020B0604020202020204" pitchFamily="34" charset="0"/>
+                <a:cs typeface="Arial" panose="020B0604020202020204" pitchFamily="34" charset="0"/>
+              </a:rPr>
+              <a:t>dirListXml</a:t>
+            </a:r>
+            <a:r>
+              <a:rPr lang="en-US" sz="900" b="1" dirty="0">
+                <a:solidFill>
+                  <a:schemeClr val="tx1"/>
+                </a:solidFill>
+                <a:latin typeface="Arial" panose="020B0604020202020204" pitchFamily="34" charset="0"/>
+                <a:cs typeface="Arial" panose="020B0604020202020204" pitchFamily="34" charset="0"/>
+              </a:rPr>
+              <a:t> (</a:t>
+            </a:r>
+            <a:r>
+              <a:rPr lang="en-US" sz="900" b="1" dirty="0" err="1">
+                <a:solidFill>
+                  <a:schemeClr val="tx1"/>
+                </a:solidFill>
+                <a:latin typeface="Arial" panose="020B0604020202020204" pitchFamily="34" charset="0"/>
+                <a:cs typeface="Arial" panose="020B0604020202020204" pitchFamily="34" charset="0"/>
+              </a:rPr>
+              <a:t>UtilFiles.php</a:t>
+            </a:r>
+            <a:r>
+              <a:rPr lang="en-US" sz="900" b="1" dirty="0">
+                <a:solidFill>
+                  <a:schemeClr val="tx1"/>
+                </a:solidFill>
+                <a:latin typeface="Arial" panose="020B0604020202020204" pitchFamily="34" charset="0"/>
+                <a:cs typeface="Arial" panose="020B0604020202020204" pitchFamily="34" charset="0"/>
+              </a:rPr>
+              <a:t>)</a:t>
+            </a:r>
+          </a:p>
+        </p:txBody>
+      </p:sp>
+      <p:sp>
+        <p:nvSpPr>
+          <p:cNvPr id="4" name="Rechteck 3">
+            <a:extLst>
+              <a:ext uri="{FF2B5EF4-FFF2-40B4-BE49-F238E27FC236}">
+                <a16:creationId xmlns:a16="http://schemas.microsoft.com/office/drawing/2014/main" id="{8928E4A0-C0D9-9703-4004-D789174F95E3}"/>
+              </a:ext>
+            </a:extLst>
+          </p:cNvPr>
+          <p:cNvSpPr/>
+          <p:nvPr/>
+        </p:nvSpPr>
+        <p:spPr>
+          <a:xfrm>
+            <a:off x="3777895" y="1722179"/>
+            <a:ext cx="2724345" cy="354586"/>
+          </a:xfrm>
+          <a:prstGeom prst="rect">
+            <a:avLst/>
+          </a:prstGeom>
+          <a:noFill/>
+          <a:ln w="19050">
+            <a:solidFill>
+              <a:schemeClr val="tx1"/>
+            </a:solidFill>
+          </a:ln>
+        </p:spPr>
+        <p:style>
+          <a:lnRef idx="2">
+            <a:schemeClr val="accent1">
+              <a:shade val="50000"/>
+            </a:schemeClr>
+          </a:lnRef>
+          <a:fillRef idx="1">
+            <a:schemeClr val="accent1"/>
+          </a:fillRef>
+          <a:effectRef idx="0">
+            <a:schemeClr val="accent1"/>
+          </a:effectRef>
+          <a:fontRef idx="minor">
+            <a:schemeClr val="lt1"/>
+          </a:fontRef>
+        </p:style>
+        <p:txBody>
+          <a:bodyPr rtlCol="0" anchor="ctr"/>
+          <a:lstStyle/>
+          <a:p>
+            <a:pPr algn="ctr"/>
+            <a:r>
+              <a:rPr lang="en-US" sz="900" b="1" dirty="0">
+                <a:solidFill>
+                  <a:schemeClr val="tx1"/>
+                </a:solidFill>
+                <a:latin typeface="Arial" panose="020B0604020202020204" pitchFamily="34" charset="0"/>
+                <a:cs typeface="Arial" panose="020B0604020202020204" pitchFamily="34" charset="0"/>
+              </a:rPr>
+              <a:t>Load the XML file</a:t>
+            </a:r>
+          </a:p>
+          <a:p>
+            <a:pPr algn="ctr"/>
+            <a:r>
+              <a:rPr lang="en-US" sz="900" b="1" dirty="0">
+                <a:solidFill>
+                  <a:schemeClr val="tx1"/>
+                </a:solidFill>
+                <a:latin typeface="Arial" panose="020B0604020202020204" pitchFamily="34" charset="0"/>
+                <a:cs typeface="Arial" panose="020B0604020202020204" pitchFamily="34" charset="0"/>
+              </a:rPr>
+              <a:t> </a:t>
+            </a:r>
+            <a:r>
+              <a:rPr lang="en-US" sz="900" b="1" dirty="0" err="1">
+                <a:solidFill>
+                  <a:schemeClr val="tx1"/>
+                </a:solidFill>
+                <a:latin typeface="Arial" panose="020B0604020202020204" pitchFamily="34" charset="0"/>
+                <a:cs typeface="Arial" panose="020B0604020202020204" pitchFamily="34" charset="0"/>
+              </a:rPr>
+              <a:t>UtilFiles.loadOneXmlFile</a:t>
+            </a:r>
+            <a:endParaRPr lang="en-US" sz="900" b="1" dirty="0">
+              <a:solidFill>
+                <a:schemeClr val="tx1"/>
+              </a:solidFill>
+              <a:latin typeface="Arial" panose="020B0604020202020204" pitchFamily="34" charset="0"/>
+              <a:cs typeface="Arial" panose="020B0604020202020204" pitchFamily="34" charset="0"/>
+            </a:endParaRPr>
+          </a:p>
+        </p:txBody>
+      </p:sp>
+      <p:cxnSp>
+        <p:nvCxnSpPr>
+          <p:cNvPr id="5" name="Gerader Verbinder 4">
+            <a:extLst>
+              <a:ext uri="{FF2B5EF4-FFF2-40B4-BE49-F238E27FC236}">
+                <a16:creationId xmlns:a16="http://schemas.microsoft.com/office/drawing/2014/main" id="{F1708E8B-5407-473C-CB8F-3E78DD0C7E09}"/>
+              </a:ext>
+            </a:extLst>
+          </p:cNvPr>
+          <p:cNvCxnSpPr/>
+          <p:nvPr/>
+        </p:nvCxnSpPr>
+        <p:spPr>
+          <a:xfrm flipH="1">
+            <a:off x="5119969" y="1459541"/>
+            <a:ext cx="9427" cy="269824"/>
+          </a:xfrm>
+          <a:prstGeom prst="line">
+            <a:avLst/>
+          </a:prstGeom>
+          <a:ln w="19050">
+            <a:solidFill>
+              <a:schemeClr val="tx1"/>
+            </a:solidFill>
+          </a:ln>
+        </p:spPr>
+        <p:style>
+          <a:lnRef idx="1">
+            <a:schemeClr val="accent1"/>
+          </a:lnRef>
+          <a:fillRef idx="0">
+            <a:schemeClr val="accent1"/>
+          </a:fillRef>
+          <a:effectRef idx="0">
+            <a:schemeClr val="accent1"/>
+          </a:effectRef>
+          <a:fontRef idx="minor">
+            <a:schemeClr val="tx1"/>
+          </a:fontRef>
+        </p:style>
+      </p:cxnSp>
+      <p:cxnSp>
+        <p:nvCxnSpPr>
+          <p:cNvPr id="6" name="Gerader Verbinder 5">
+            <a:extLst>
+              <a:ext uri="{FF2B5EF4-FFF2-40B4-BE49-F238E27FC236}">
+                <a16:creationId xmlns:a16="http://schemas.microsoft.com/office/drawing/2014/main" id="{7D91BC03-E629-EB90-2485-7716958C2681}"/>
+              </a:ext>
+            </a:extLst>
+          </p:cNvPr>
+          <p:cNvCxnSpPr/>
+          <p:nvPr/>
+        </p:nvCxnSpPr>
+        <p:spPr>
+          <a:xfrm flipH="1">
+            <a:off x="5124683" y="858621"/>
+            <a:ext cx="9427" cy="269824"/>
+          </a:xfrm>
+          <a:prstGeom prst="line">
+            <a:avLst/>
+          </a:prstGeom>
+          <a:ln w="19050">
+            <a:solidFill>
+              <a:schemeClr val="tx1"/>
+            </a:solidFill>
+          </a:ln>
+        </p:spPr>
+        <p:style>
+          <a:lnRef idx="1">
+            <a:schemeClr val="accent1"/>
+          </a:lnRef>
+          <a:fillRef idx="0">
+            <a:schemeClr val="accent1"/>
+          </a:fillRef>
+          <a:effectRef idx="0">
+            <a:schemeClr val="accent1"/>
+          </a:effectRef>
+          <a:fontRef idx="minor">
+            <a:schemeClr val="tx1"/>
+          </a:fontRef>
+        </p:style>
+      </p:cxnSp>
+      <p:sp>
+        <p:nvSpPr>
+          <p:cNvPr id="10" name="Rechteck 9">
+            <a:extLst>
+              <a:ext uri="{FF2B5EF4-FFF2-40B4-BE49-F238E27FC236}">
+                <a16:creationId xmlns:a16="http://schemas.microsoft.com/office/drawing/2014/main" id="{1D41D8B5-6326-213C-1018-DF9F24765B86}"/>
+              </a:ext>
+            </a:extLst>
+          </p:cNvPr>
+          <p:cNvSpPr/>
+          <p:nvPr/>
+        </p:nvSpPr>
+        <p:spPr>
+          <a:xfrm>
+            <a:off x="1021036" y="1133934"/>
+            <a:ext cx="793008" cy="443996"/>
+          </a:xfrm>
+          <a:prstGeom prst="rect">
+            <a:avLst/>
+          </a:prstGeom>
+          <a:noFill/>
+          <a:ln w="19050">
+            <a:solidFill>
+              <a:schemeClr val="tx1"/>
+            </a:solidFill>
+          </a:ln>
+        </p:spPr>
+        <p:style>
+          <a:lnRef idx="2">
+            <a:schemeClr val="accent1">
+              <a:shade val="50000"/>
+            </a:schemeClr>
+          </a:lnRef>
+          <a:fillRef idx="1">
+            <a:schemeClr val="accent1"/>
+          </a:fillRef>
+          <a:effectRef idx="0">
+            <a:schemeClr val="accent1"/>
+          </a:effectRef>
+          <a:fontRef idx="minor">
+            <a:schemeClr val="lt1"/>
+          </a:fontRef>
+        </p:style>
+        <p:txBody>
+          <a:bodyPr rtlCol="0" anchor="ctr"/>
+          <a:lstStyle/>
+          <a:p>
+            <a:pPr algn="ctr"/>
+            <a:r>
+              <a:rPr lang="en-US" sz="1200" b="1" dirty="0">
+                <a:solidFill>
+                  <a:schemeClr val="tx1"/>
+                </a:solidFill>
+                <a:latin typeface="Arial" panose="020B0604020202020204" pitchFamily="34" charset="0"/>
+                <a:cs typeface="Arial" panose="020B0604020202020204" pitchFamily="34" charset="0"/>
+              </a:rPr>
+              <a:t>G</a:t>
+            </a:r>
+          </a:p>
+        </p:txBody>
+      </p:sp>
+      <p:cxnSp>
+        <p:nvCxnSpPr>
+          <p:cNvPr id="11" name="Gerader Verbinder 10">
+            <a:extLst>
+              <a:ext uri="{FF2B5EF4-FFF2-40B4-BE49-F238E27FC236}">
+                <a16:creationId xmlns:a16="http://schemas.microsoft.com/office/drawing/2014/main" id="{418C1F39-33FA-AB8C-0771-6826EF241A14}"/>
+              </a:ext>
+            </a:extLst>
+          </p:cNvPr>
+          <p:cNvCxnSpPr>
+            <a:cxnSpLocks/>
+          </p:cNvCxnSpPr>
+          <p:nvPr/>
+        </p:nvCxnSpPr>
+        <p:spPr>
+          <a:xfrm flipH="1">
+            <a:off x="1406535" y="1566546"/>
+            <a:ext cx="4328" cy="410627"/>
+          </a:xfrm>
+          <a:prstGeom prst="line">
+            <a:avLst/>
+          </a:prstGeom>
+          <a:ln w="19050">
+            <a:solidFill>
+              <a:schemeClr val="tx1"/>
+            </a:solidFill>
+          </a:ln>
+        </p:spPr>
+        <p:style>
+          <a:lnRef idx="1">
+            <a:schemeClr val="accent1"/>
+          </a:lnRef>
+          <a:fillRef idx="0">
+            <a:schemeClr val="accent1"/>
+          </a:fillRef>
+          <a:effectRef idx="0">
+            <a:schemeClr val="accent1"/>
+          </a:effectRef>
+          <a:fontRef idx="minor">
+            <a:schemeClr val="tx1"/>
+          </a:fontRef>
+        </p:style>
+      </p:cxnSp>
+      <p:sp>
+        <p:nvSpPr>
+          <p:cNvPr id="12" name="Rechteck 11">
+            <a:extLst>
+              <a:ext uri="{FF2B5EF4-FFF2-40B4-BE49-F238E27FC236}">
+                <a16:creationId xmlns:a16="http://schemas.microsoft.com/office/drawing/2014/main" id="{5255A825-D3A8-5C5B-8290-62D752CE1697}"/>
+              </a:ext>
+            </a:extLst>
+          </p:cNvPr>
+          <p:cNvSpPr/>
+          <p:nvPr/>
+        </p:nvSpPr>
+        <p:spPr>
+          <a:xfrm>
+            <a:off x="934037" y="1988860"/>
+            <a:ext cx="945777" cy="596769"/>
+          </a:xfrm>
+          <a:prstGeom prst="rect">
+            <a:avLst/>
+          </a:prstGeom>
+          <a:noFill/>
+          <a:ln w="19050">
+            <a:solidFill>
+              <a:schemeClr val="tx1"/>
+            </a:solidFill>
+          </a:ln>
+        </p:spPr>
+        <p:style>
+          <a:lnRef idx="2">
+            <a:schemeClr val="accent1">
+              <a:shade val="50000"/>
+            </a:schemeClr>
+          </a:lnRef>
+          <a:fillRef idx="1">
+            <a:schemeClr val="accent1"/>
+          </a:fillRef>
+          <a:effectRef idx="0">
+            <a:schemeClr val="accent1"/>
+          </a:effectRef>
+          <a:fontRef idx="minor">
+            <a:schemeClr val="lt1"/>
+          </a:fontRef>
+        </p:style>
+        <p:txBody>
+          <a:bodyPr rtlCol="0" anchor="ctr"/>
+          <a:lstStyle/>
+          <a:p>
+            <a:pPr algn="ctr"/>
+            <a:r>
+              <a:rPr lang="en-US" sz="1200" b="1" dirty="0">
+                <a:solidFill>
+                  <a:schemeClr val="tx1"/>
+                </a:solidFill>
+                <a:latin typeface="Arial" panose="020B0604020202020204" pitchFamily="34" charset="0"/>
+                <a:cs typeface="Arial" panose="020B0604020202020204" pitchFamily="34" charset="0"/>
+              </a:rPr>
+              <a:t>H</a:t>
+            </a:r>
+          </a:p>
+          <a:p>
+            <a:pPr algn="ctr"/>
+            <a:r>
+              <a:rPr lang="en-US" sz="1200" b="1" dirty="0">
+                <a:solidFill>
+                  <a:schemeClr val="tx1"/>
+                </a:solidFill>
+                <a:latin typeface="Arial" panose="020B0604020202020204" pitchFamily="34" charset="0"/>
+                <a:cs typeface="Arial" panose="020B0604020202020204" pitchFamily="34" charset="0"/>
+              </a:rPr>
+              <a:t>Base PHP</a:t>
+            </a:r>
+          </a:p>
+        </p:txBody>
+      </p:sp>
+      <p:sp>
+        <p:nvSpPr>
+          <p:cNvPr id="13" name="Flussdiagramm: Karte 12">
+            <a:extLst>
+              <a:ext uri="{FF2B5EF4-FFF2-40B4-BE49-F238E27FC236}">
+                <a16:creationId xmlns:a16="http://schemas.microsoft.com/office/drawing/2014/main" id="{B8CF3957-C2FA-332E-CEA7-938E08BF8BCC}"/>
+              </a:ext>
+            </a:extLst>
+          </p:cNvPr>
+          <p:cNvSpPr/>
+          <p:nvPr/>
+        </p:nvSpPr>
+        <p:spPr>
+          <a:xfrm>
+            <a:off x="869476" y="2858679"/>
+            <a:ext cx="1081066" cy="308175"/>
+          </a:xfrm>
+          <a:prstGeom prst="flowChartPunchedCard">
+            <a:avLst/>
+          </a:prstGeom>
+          <a:noFill/>
+          <a:ln w="19050">
+            <a:solidFill>
+              <a:schemeClr val="tx1"/>
+            </a:solidFill>
+          </a:ln>
+        </p:spPr>
+        <p:style>
+          <a:lnRef idx="2">
+            <a:schemeClr val="accent1">
+              <a:shade val="15000"/>
+            </a:schemeClr>
+          </a:lnRef>
+          <a:fillRef idx="1">
+            <a:schemeClr val="accent1"/>
+          </a:fillRef>
+          <a:effectRef idx="0">
+            <a:schemeClr val="accent1"/>
+          </a:effectRef>
+          <a:fontRef idx="minor">
+            <a:schemeClr val="lt1"/>
+          </a:fontRef>
+        </p:style>
+        <p:txBody>
+          <a:bodyPr rtlCol="0" anchor="ctr"/>
+          <a:lstStyle/>
+          <a:p>
+            <a:pPr algn="ctr"/>
+            <a:r>
+              <a:rPr lang="de-CH" sz="1200" b="1" dirty="0" err="1">
+                <a:solidFill>
+                  <a:schemeClr val="tx1"/>
+                </a:solidFill>
+                <a:latin typeface="Arial Narrow" panose="020B0606020202030204" pitchFamily="34" charset="0"/>
+              </a:rPr>
+              <a:t>UtilFiles.php</a:t>
+            </a:r>
+            <a:endParaRPr lang="de-CH" sz="1200" b="1" dirty="0">
+              <a:solidFill>
+                <a:schemeClr val="tx1"/>
+              </a:solidFill>
+              <a:latin typeface="Arial Narrow" panose="020B0606020202030204" pitchFamily="34" charset="0"/>
+            </a:endParaRPr>
+          </a:p>
+        </p:txBody>
+      </p:sp>
+      <p:cxnSp>
+        <p:nvCxnSpPr>
+          <p:cNvPr id="14" name="Gerader Verbinder 13">
+            <a:extLst>
+              <a:ext uri="{FF2B5EF4-FFF2-40B4-BE49-F238E27FC236}">
+                <a16:creationId xmlns:a16="http://schemas.microsoft.com/office/drawing/2014/main" id="{3EBC4C63-D2BC-EB7F-3356-89F42B088CAB}"/>
+              </a:ext>
+            </a:extLst>
+          </p:cNvPr>
+          <p:cNvCxnSpPr>
+            <a:cxnSpLocks/>
+          </p:cNvCxnSpPr>
+          <p:nvPr/>
+        </p:nvCxnSpPr>
+        <p:spPr>
+          <a:xfrm flipH="1">
+            <a:off x="1409011" y="2596944"/>
+            <a:ext cx="1507" cy="261735"/>
+          </a:xfrm>
+          <a:prstGeom prst="line">
+            <a:avLst/>
+          </a:prstGeom>
+          <a:ln w="19050">
+            <a:solidFill>
+              <a:schemeClr val="tx1"/>
+            </a:solidFill>
+          </a:ln>
+        </p:spPr>
+        <p:style>
+          <a:lnRef idx="1">
+            <a:schemeClr val="accent1"/>
+          </a:lnRef>
+          <a:fillRef idx="0">
+            <a:schemeClr val="accent1"/>
+          </a:fillRef>
+          <a:effectRef idx="0">
+            <a:schemeClr val="accent1"/>
+          </a:effectRef>
+          <a:fontRef idx="minor">
+            <a:schemeClr val="tx1"/>
+          </a:fontRef>
+        </p:style>
+      </p:cxnSp>
+      <p:cxnSp>
+        <p:nvCxnSpPr>
+          <p:cNvPr id="15" name="Gerader Verbinder 14">
+            <a:extLst>
+              <a:ext uri="{FF2B5EF4-FFF2-40B4-BE49-F238E27FC236}">
+                <a16:creationId xmlns:a16="http://schemas.microsoft.com/office/drawing/2014/main" id="{4B83BE54-ED61-D288-E886-F9FFFC1F068C}"/>
+              </a:ext>
+            </a:extLst>
+          </p:cNvPr>
+          <p:cNvCxnSpPr>
+            <a:cxnSpLocks/>
+          </p:cNvCxnSpPr>
+          <p:nvPr/>
+        </p:nvCxnSpPr>
+        <p:spPr>
+          <a:xfrm flipH="1">
+            <a:off x="1441618" y="718977"/>
+            <a:ext cx="4328" cy="410627"/>
+          </a:xfrm>
+          <a:prstGeom prst="line">
+            <a:avLst/>
+          </a:prstGeom>
+          <a:ln w="19050">
+            <a:solidFill>
+              <a:schemeClr val="tx1"/>
+            </a:solidFill>
+          </a:ln>
+        </p:spPr>
+        <p:style>
+          <a:lnRef idx="1">
+            <a:schemeClr val="accent1"/>
+          </a:lnRef>
+          <a:fillRef idx="0">
+            <a:schemeClr val="accent1"/>
+          </a:fillRef>
+          <a:effectRef idx="0">
+            <a:schemeClr val="accent1"/>
+          </a:effectRef>
+          <a:fontRef idx="minor">
+            <a:schemeClr val="tx1"/>
+          </a:fontRef>
+        </p:style>
+      </p:cxnSp>
+      <p:sp>
+        <p:nvSpPr>
+          <p:cNvPr id="16" name="Rechteck 15">
+            <a:extLst>
+              <a:ext uri="{FF2B5EF4-FFF2-40B4-BE49-F238E27FC236}">
+                <a16:creationId xmlns:a16="http://schemas.microsoft.com/office/drawing/2014/main" id="{E87D8E78-198D-2754-F200-B8A0E3B49B49}"/>
+              </a:ext>
+            </a:extLst>
+          </p:cNvPr>
+          <p:cNvSpPr/>
+          <p:nvPr/>
+        </p:nvSpPr>
+        <p:spPr>
+          <a:xfrm>
+            <a:off x="2110614" y="2217939"/>
+            <a:ext cx="1115333" cy="366844"/>
+          </a:xfrm>
+          <a:prstGeom prst="rect">
+            <a:avLst/>
+          </a:prstGeom>
+          <a:noFill/>
+          <a:ln w="19050">
+            <a:solidFill>
+              <a:schemeClr val="tx1"/>
+            </a:solidFill>
+          </a:ln>
+        </p:spPr>
+        <p:style>
+          <a:lnRef idx="2">
+            <a:schemeClr val="accent1">
+              <a:shade val="50000"/>
+            </a:schemeClr>
+          </a:lnRef>
+          <a:fillRef idx="1">
+            <a:schemeClr val="accent1"/>
+          </a:fillRef>
+          <a:effectRef idx="0">
+            <a:schemeClr val="accent1"/>
+          </a:effectRef>
+          <a:fontRef idx="minor">
+            <a:schemeClr val="lt1"/>
+          </a:fontRef>
+        </p:style>
+        <p:txBody>
+          <a:bodyPr rtlCol="0" anchor="ctr"/>
+          <a:lstStyle/>
+          <a:p>
+            <a:pPr algn="ctr"/>
+            <a:r>
+              <a:rPr lang="en-US" sz="1100" b="1" dirty="0" err="1">
+                <a:solidFill>
+                  <a:schemeClr val="tx1"/>
+                </a:solidFill>
+                <a:latin typeface="Arial" panose="020B0604020202020204" pitchFamily="34" charset="0"/>
+                <a:cs typeface="Arial" panose="020B0604020202020204" pitchFamily="34" charset="0"/>
+              </a:rPr>
+              <a:t>tempScanDir</a:t>
+            </a:r>
+            <a:r>
+              <a:rPr lang="en-US" sz="1100" b="1" dirty="0">
+                <a:solidFill>
+                  <a:schemeClr val="tx1"/>
+                </a:solidFill>
+                <a:latin typeface="Arial" panose="020B0604020202020204" pitchFamily="34" charset="0"/>
+                <a:cs typeface="Arial" panose="020B0604020202020204" pitchFamily="34" charset="0"/>
+              </a:rPr>
+              <a:t> </a:t>
+            </a:r>
+          </a:p>
+        </p:txBody>
+      </p:sp>
+      <p:sp>
+        <p:nvSpPr>
+          <p:cNvPr id="17" name="Flussdiagramm: Karte 16">
+            <a:extLst>
+              <a:ext uri="{FF2B5EF4-FFF2-40B4-BE49-F238E27FC236}">
+                <a16:creationId xmlns:a16="http://schemas.microsoft.com/office/drawing/2014/main" id="{0660123F-66B0-85BA-7819-4FA56C196E15}"/>
+              </a:ext>
+            </a:extLst>
+          </p:cNvPr>
+          <p:cNvSpPr/>
+          <p:nvPr/>
+        </p:nvSpPr>
+        <p:spPr>
+          <a:xfrm>
+            <a:off x="2057560" y="2846518"/>
+            <a:ext cx="1081066" cy="308175"/>
+          </a:xfrm>
+          <a:prstGeom prst="flowChartPunchedCard">
+            <a:avLst/>
+          </a:prstGeom>
+          <a:noFill/>
+          <a:ln w="19050">
+            <a:solidFill>
+              <a:schemeClr val="tx1"/>
+            </a:solidFill>
+          </a:ln>
+        </p:spPr>
+        <p:style>
+          <a:lnRef idx="2">
+            <a:schemeClr val="accent1">
+              <a:shade val="15000"/>
+            </a:schemeClr>
+          </a:lnRef>
+          <a:fillRef idx="1">
+            <a:schemeClr val="accent1"/>
+          </a:fillRef>
+          <a:effectRef idx="0">
+            <a:schemeClr val="accent1"/>
+          </a:effectRef>
+          <a:fontRef idx="minor">
+            <a:schemeClr val="lt1"/>
+          </a:fontRef>
+        </p:style>
+        <p:txBody>
+          <a:bodyPr rtlCol="0" anchor="ctr"/>
+          <a:lstStyle/>
+          <a:p>
+            <a:pPr algn="ctr"/>
+            <a:r>
+              <a:rPr lang="de-CH" sz="1200" b="1" dirty="0">
+                <a:solidFill>
+                  <a:schemeClr val="tx1"/>
+                </a:solidFill>
+                <a:latin typeface="Arial Narrow" panose="020B0606020202030204" pitchFamily="34" charset="0"/>
+              </a:rPr>
+              <a:t>ListDir.xml </a:t>
+            </a:r>
+          </a:p>
+        </p:txBody>
+      </p:sp>
+      <p:cxnSp>
+        <p:nvCxnSpPr>
+          <p:cNvPr id="18" name="Gerader Verbinder 17">
+            <a:extLst>
+              <a:ext uri="{FF2B5EF4-FFF2-40B4-BE49-F238E27FC236}">
+                <a16:creationId xmlns:a16="http://schemas.microsoft.com/office/drawing/2014/main" id="{3841511A-8E43-D5F9-2667-78564B6B3092}"/>
+              </a:ext>
+            </a:extLst>
+          </p:cNvPr>
+          <p:cNvCxnSpPr>
+            <a:cxnSpLocks/>
+          </p:cNvCxnSpPr>
+          <p:nvPr/>
+        </p:nvCxnSpPr>
+        <p:spPr>
+          <a:xfrm flipH="1">
+            <a:off x="2597095" y="2584783"/>
+            <a:ext cx="1507" cy="261735"/>
+          </a:xfrm>
+          <a:prstGeom prst="line">
+            <a:avLst/>
+          </a:prstGeom>
+          <a:ln w="19050">
+            <a:solidFill>
+              <a:schemeClr val="tx1"/>
+            </a:solidFill>
+          </a:ln>
+        </p:spPr>
+        <p:style>
+          <a:lnRef idx="1">
+            <a:schemeClr val="accent1"/>
+          </a:lnRef>
+          <a:fillRef idx="0">
+            <a:schemeClr val="accent1"/>
+          </a:fillRef>
+          <a:effectRef idx="0">
+            <a:schemeClr val="accent1"/>
+          </a:effectRef>
+          <a:fontRef idx="minor">
+            <a:schemeClr val="tx1"/>
+          </a:fontRef>
+        </p:style>
+      </p:cxnSp>
+      <p:cxnSp>
+        <p:nvCxnSpPr>
+          <p:cNvPr id="19" name="Gerader Verbinder 18">
+            <a:extLst>
+              <a:ext uri="{FF2B5EF4-FFF2-40B4-BE49-F238E27FC236}">
+                <a16:creationId xmlns:a16="http://schemas.microsoft.com/office/drawing/2014/main" id="{4D8AF49E-B88C-0D5A-50E4-D3CD544A5617}"/>
+              </a:ext>
+            </a:extLst>
+          </p:cNvPr>
+          <p:cNvCxnSpPr>
+            <a:cxnSpLocks/>
+            <a:endCxn id="16" idx="1"/>
+          </p:cNvCxnSpPr>
+          <p:nvPr/>
+        </p:nvCxnSpPr>
+        <p:spPr>
+          <a:xfrm>
+            <a:off x="1879814" y="2401361"/>
+            <a:ext cx="230800" cy="0"/>
+          </a:xfrm>
+          <a:prstGeom prst="line">
+            <a:avLst/>
+          </a:prstGeom>
+          <a:ln w="19050">
+            <a:solidFill>
+              <a:schemeClr val="tx1"/>
+            </a:solidFill>
+          </a:ln>
+        </p:spPr>
+        <p:style>
+          <a:lnRef idx="1">
+            <a:schemeClr val="accent1"/>
+          </a:lnRef>
+          <a:fillRef idx="0">
+            <a:schemeClr val="accent1"/>
+          </a:fillRef>
+          <a:effectRef idx="0">
+            <a:schemeClr val="accent1"/>
+          </a:effectRef>
+          <a:fontRef idx="minor">
+            <a:schemeClr val="tx1"/>
+          </a:fontRef>
+        </p:style>
+      </p:cxnSp>
+      <p:sp>
+        <p:nvSpPr>
+          <p:cNvPr id="25" name="Rechteck 24">
+            <a:extLst>
+              <a:ext uri="{FF2B5EF4-FFF2-40B4-BE49-F238E27FC236}">
+                <a16:creationId xmlns:a16="http://schemas.microsoft.com/office/drawing/2014/main" id="{BC94CC69-FB3F-5B24-1434-B4F6BB248411}"/>
+              </a:ext>
+            </a:extLst>
+          </p:cNvPr>
+          <p:cNvSpPr/>
+          <p:nvPr/>
+        </p:nvSpPr>
+        <p:spPr>
+          <a:xfrm>
+            <a:off x="869479" y="3401711"/>
+            <a:ext cx="2298482" cy="465084"/>
+          </a:xfrm>
+          <a:prstGeom prst="rect">
+            <a:avLst/>
+          </a:prstGeom>
+          <a:noFill/>
+          <a:ln w="19050">
+            <a:solidFill>
+              <a:schemeClr val="tx1"/>
+            </a:solidFill>
+          </a:ln>
+        </p:spPr>
+        <p:style>
+          <a:lnRef idx="2">
+            <a:schemeClr val="accent1">
+              <a:shade val="50000"/>
+            </a:schemeClr>
+          </a:lnRef>
+          <a:fillRef idx="1">
+            <a:schemeClr val="accent1"/>
+          </a:fillRef>
+          <a:effectRef idx="0">
+            <a:schemeClr val="accent1"/>
+          </a:effectRef>
+          <a:fontRef idx="minor">
+            <a:schemeClr val="lt1"/>
+          </a:fontRef>
+        </p:style>
+        <p:txBody>
+          <a:bodyPr rtlCol="0" anchor="ctr"/>
+          <a:lstStyle/>
+          <a:p>
+            <a:pPr algn="ctr"/>
+            <a:r>
+              <a:rPr lang="de-CH" sz="1400" b="1" dirty="0" err="1">
+                <a:solidFill>
+                  <a:schemeClr val="tx1"/>
+                </a:solidFill>
+                <a:latin typeface="Arial" panose="020B0604020202020204" pitchFamily="34" charset="0"/>
+                <a:cs typeface="Arial" panose="020B0604020202020204" pitchFamily="34" charset="0"/>
+              </a:rPr>
+              <a:t>UtilFilesData</a:t>
+            </a:r>
+            <a:r>
+              <a:rPr lang="de-CH" dirty="0">
+                <a:solidFill>
+                  <a:schemeClr val="tx1"/>
+                </a:solidFill>
+                <a:latin typeface="Arial" panose="020B0604020202020204" pitchFamily="34" charset="0"/>
+                <a:cs typeface="Arial" panose="020B0604020202020204" pitchFamily="34" charset="0"/>
+              </a:rPr>
+              <a:t> </a:t>
+            </a:r>
+          </a:p>
+          <a:p>
+            <a:pPr algn="ctr"/>
+            <a:r>
+              <a:rPr lang="de-CH" sz="1200" dirty="0">
+                <a:solidFill>
+                  <a:schemeClr val="tx1"/>
+                </a:solidFill>
+                <a:latin typeface="Arial" panose="020B0604020202020204" pitchFamily="34" charset="0"/>
+                <a:cs typeface="Arial" panose="020B0604020202020204" pitchFamily="34" charset="0"/>
+              </a:rPr>
+              <a:t>Holds </a:t>
+            </a:r>
+            <a:r>
+              <a:rPr lang="de-CH" sz="1200" dirty="0" err="1">
+                <a:solidFill>
+                  <a:schemeClr val="tx1"/>
+                </a:solidFill>
+                <a:latin typeface="Arial" panose="020B0604020202020204" pitchFamily="34" charset="0"/>
+                <a:cs typeface="Arial" panose="020B0604020202020204" pitchFamily="34" charset="0"/>
+              </a:rPr>
+              <a:t>data</a:t>
+            </a:r>
+            <a:r>
+              <a:rPr lang="de-CH" sz="1200" dirty="0">
+                <a:solidFill>
+                  <a:schemeClr val="tx1"/>
+                </a:solidFill>
+                <a:latin typeface="Arial" panose="020B0604020202020204" pitchFamily="34" charset="0"/>
+                <a:cs typeface="Arial" panose="020B0604020202020204" pitchFamily="34" charset="0"/>
+              </a:rPr>
+              <a:t> </a:t>
+            </a:r>
+            <a:r>
+              <a:rPr lang="de-CH" sz="1200" dirty="0" err="1">
+                <a:solidFill>
+                  <a:schemeClr val="tx1"/>
+                </a:solidFill>
+                <a:latin typeface="Arial" panose="020B0604020202020204" pitchFamily="34" charset="0"/>
+                <a:cs typeface="Arial" panose="020B0604020202020204" pitchFamily="34" charset="0"/>
+              </a:rPr>
+              <a:t>for</a:t>
+            </a:r>
+            <a:r>
+              <a:rPr lang="de-CH" sz="1200" dirty="0">
+                <a:solidFill>
+                  <a:schemeClr val="tx1"/>
+                </a:solidFill>
+                <a:latin typeface="Arial" panose="020B0604020202020204" pitchFamily="34" charset="0"/>
+                <a:cs typeface="Arial" panose="020B0604020202020204" pitchFamily="34" charset="0"/>
+              </a:rPr>
+              <a:t> </a:t>
+            </a:r>
+            <a:r>
+              <a:rPr lang="de-CH" sz="1200" dirty="0" err="1">
+                <a:solidFill>
+                  <a:schemeClr val="tx1"/>
+                </a:solidFill>
+                <a:latin typeface="Arial" panose="020B0604020202020204" pitchFamily="34" charset="0"/>
+                <a:cs typeface="Arial" panose="020B0604020202020204" pitchFamily="34" charset="0"/>
+              </a:rPr>
+              <a:t>UtilFiles</a:t>
+            </a:r>
+            <a:endParaRPr lang="de-CH" sz="1200" dirty="0">
+              <a:solidFill>
+                <a:schemeClr val="tx1"/>
+              </a:solidFill>
+              <a:latin typeface="Arial" panose="020B0604020202020204" pitchFamily="34" charset="0"/>
+              <a:cs typeface="Arial" panose="020B0604020202020204" pitchFamily="34" charset="0"/>
+            </a:endParaRPr>
+          </a:p>
+        </p:txBody>
+      </p:sp>
+      <p:sp>
+        <p:nvSpPr>
+          <p:cNvPr id="26" name="Rechteck 25">
+            <a:extLst>
+              <a:ext uri="{FF2B5EF4-FFF2-40B4-BE49-F238E27FC236}">
+                <a16:creationId xmlns:a16="http://schemas.microsoft.com/office/drawing/2014/main" id="{D4D91B02-18C4-9078-69E4-DB48E2EC5190}"/>
+              </a:ext>
+            </a:extLst>
+          </p:cNvPr>
+          <p:cNvSpPr/>
+          <p:nvPr/>
+        </p:nvSpPr>
+        <p:spPr>
+          <a:xfrm>
+            <a:off x="869476" y="3857394"/>
+            <a:ext cx="2298482" cy="1739081"/>
+          </a:xfrm>
+          <a:prstGeom prst="rect">
+            <a:avLst/>
+          </a:prstGeom>
+          <a:noFill/>
+          <a:ln w="19050">
+            <a:solidFill>
+              <a:schemeClr val="tx1"/>
+            </a:solidFill>
+          </a:ln>
+        </p:spPr>
+        <p:style>
+          <a:lnRef idx="2">
+            <a:schemeClr val="accent1">
+              <a:shade val="50000"/>
+            </a:schemeClr>
+          </a:lnRef>
+          <a:fillRef idx="1">
+            <a:schemeClr val="accent1"/>
+          </a:fillRef>
+          <a:effectRef idx="0">
+            <a:schemeClr val="accent1"/>
+          </a:effectRef>
+          <a:fontRef idx="minor">
+            <a:schemeClr val="lt1"/>
+          </a:fontRef>
+        </p:style>
+        <p:txBody>
+          <a:bodyPr rtlCol="0" anchor="ctr"/>
+          <a:lstStyle/>
+          <a:p>
+            <a:r>
+              <a:rPr lang="en-US" sz="1200" dirty="0">
+                <a:solidFill>
+                  <a:schemeClr val="tx1"/>
+                </a:solidFill>
+                <a:latin typeface="Arial" panose="020B0604020202020204" pitchFamily="34" charset="0"/>
+                <a:cs typeface="Arial" panose="020B0604020202020204" pitchFamily="34" charset="0"/>
+              </a:rPr>
+              <a:t>Member variables</a:t>
+            </a:r>
+            <a:endParaRPr lang="en-US" sz="1000" b="1" dirty="0">
+              <a:solidFill>
+                <a:schemeClr val="tx1"/>
+              </a:solidFill>
+              <a:latin typeface="Arial" panose="020B0604020202020204" pitchFamily="34" charset="0"/>
+              <a:cs typeface="Arial" panose="020B0604020202020204" pitchFamily="34" charset="0"/>
+            </a:endParaRPr>
+          </a:p>
+          <a:p>
+            <a:r>
+              <a:rPr lang="en-US" sz="1000" b="1" dirty="0">
+                <a:solidFill>
+                  <a:schemeClr val="tx1"/>
+                </a:solidFill>
+                <a:latin typeface="Arial" panose="020B0604020202020204" pitchFamily="34" charset="0"/>
+                <a:cs typeface="Arial" panose="020B0604020202020204" pitchFamily="34" charset="0"/>
+              </a:rPr>
+              <a:t>….</a:t>
+            </a:r>
+          </a:p>
+          <a:p>
+            <a:r>
+              <a:rPr lang="en-US" sz="1000" b="1" dirty="0" err="1">
+                <a:solidFill>
+                  <a:schemeClr val="tx1"/>
+                </a:solidFill>
+                <a:latin typeface="Arial" panose="020B0604020202020204" pitchFamily="34" charset="0"/>
+                <a:cs typeface="Arial" panose="020B0604020202020204" pitchFamily="34" charset="0"/>
+              </a:rPr>
+              <a:t>m_callback_function_array</a:t>
+            </a:r>
+            <a:endParaRPr lang="en-US" sz="1000" b="1" dirty="0">
+              <a:solidFill>
+                <a:schemeClr val="tx1"/>
+              </a:solidFill>
+              <a:latin typeface="Arial" panose="020B0604020202020204" pitchFamily="34" charset="0"/>
+              <a:cs typeface="Arial" panose="020B0604020202020204" pitchFamily="34" charset="0"/>
+            </a:endParaRPr>
+          </a:p>
+          <a:p>
+            <a:r>
+              <a:rPr lang="en-US" sz="1000" b="1" dirty="0" err="1">
+                <a:solidFill>
+                  <a:schemeClr val="tx1"/>
+                </a:solidFill>
+                <a:latin typeface="Arial" panose="020B0604020202020204" pitchFamily="34" charset="0"/>
+                <a:cs typeface="Arial" panose="020B0604020202020204" pitchFamily="34" charset="0"/>
+              </a:rPr>
+              <a:t>m_callback_function_array_index</a:t>
+            </a:r>
+            <a:endParaRPr lang="en-US" sz="1000" b="1" dirty="0">
+              <a:solidFill>
+                <a:schemeClr val="tx1"/>
+              </a:solidFill>
+              <a:latin typeface="Arial" panose="020B0604020202020204" pitchFamily="34" charset="0"/>
+              <a:cs typeface="Arial" panose="020B0604020202020204" pitchFamily="34" charset="0"/>
+            </a:endParaRPr>
+          </a:p>
+          <a:p>
+            <a:r>
+              <a:rPr lang="en-US" sz="1000" b="1" dirty="0" err="1">
+                <a:solidFill>
+                  <a:schemeClr val="tx1"/>
+                </a:solidFill>
+                <a:latin typeface="Arial" panose="020B0604020202020204" pitchFamily="34" charset="0"/>
+                <a:cs typeface="Arial" panose="020B0604020202020204" pitchFamily="34" charset="0"/>
+              </a:rPr>
+              <a:t>m_output_array_case</a:t>
+            </a:r>
+            <a:endParaRPr lang="en-US" sz="1000" b="1" dirty="0">
+              <a:solidFill>
+                <a:schemeClr val="tx1"/>
+              </a:solidFill>
+              <a:latin typeface="Arial" panose="020B0604020202020204" pitchFamily="34" charset="0"/>
+              <a:cs typeface="Arial" panose="020B0604020202020204" pitchFamily="34" charset="0"/>
+            </a:endParaRPr>
+          </a:p>
+          <a:p>
+            <a:r>
+              <a:rPr lang="en-US" sz="1000" b="1" dirty="0">
+                <a:solidFill>
+                  <a:schemeClr val="tx1"/>
+                </a:solidFill>
+                <a:latin typeface="Arial" panose="020B0604020202020204" pitchFamily="34" charset="0"/>
+                <a:cs typeface="Arial" panose="020B0604020202020204" pitchFamily="34" charset="0"/>
+              </a:rPr>
+              <a:t>----</a:t>
+            </a:r>
+          </a:p>
+          <a:p>
+            <a:r>
+              <a:rPr lang="en-US" sz="1200" dirty="0">
+                <a:solidFill>
+                  <a:schemeClr val="tx1"/>
+                </a:solidFill>
+                <a:latin typeface="Arial" panose="020B0604020202020204" pitchFamily="34" charset="0"/>
+                <a:cs typeface="Arial" panose="020B0604020202020204" pitchFamily="34" charset="0"/>
+              </a:rPr>
+              <a:t>Member functions</a:t>
+            </a:r>
+          </a:p>
+          <a:p>
+            <a:r>
+              <a:rPr lang="en-US" sz="800" b="1" dirty="0" err="1">
+                <a:solidFill>
+                  <a:schemeClr val="tx1"/>
+                </a:solidFill>
+                <a:latin typeface="Arial" panose="020B0604020202020204" pitchFamily="34" charset="0"/>
+                <a:cs typeface="Arial" panose="020B0604020202020204" pitchFamily="34" charset="0"/>
+              </a:rPr>
+              <a:t>setDataExecCaseScanDir</a:t>
+            </a:r>
+            <a:endParaRPr lang="en-US" sz="800" b="1" dirty="0">
+              <a:solidFill>
+                <a:schemeClr val="tx1"/>
+              </a:solidFill>
+              <a:latin typeface="Arial" panose="020B0604020202020204" pitchFamily="34" charset="0"/>
+              <a:cs typeface="Arial" panose="020B0604020202020204" pitchFamily="34" charset="0"/>
+            </a:endParaRPr>
+          </a:p>
+          <a:p>
+            <a:r>
+              <a:rPr lang="en-US" sz="800" b="1" dirty="0" err="1">
+                <a:solidFill>
+                  <a:schemeClr val="tx1"/>
+                </a:solidFill>
+                <a:latin typeface="Arial" panose="020B0604020202020204" pitchFamily="34" charset="0"/>
+                <a:cs typeface="Arial" panose="020B0604020202020204" pitchFamily="34" charset="0"/>
+              </a:rPr>
+              <a:t>getCurrentCallbackFunction</a:t>
+            </a:r>
+            <a:endParaRPr lang="en-US" sz="800" b="1" dirty="0">
+              <a:solidFill>
+                <a:schemeClr val="tx1"/>
+              </a:solidFill>
+              <a:latin typeface="Arial" panose="020B0604020202020204" pitchFamily="34" charset="0"/>
+              <a:cs typeface="Arial" panose="020B0604020202020204" pitchFamily="34" charset="0"/>
+            </a:endParaRPr>
+          </a:p>
+          <a:p>
+            <a:r>
+              <a:rPr lang="en-US" sz="800" b="1" dirty="0" err="1">
+                <a:solidFill>
+                  <a:schemeClr val="tx1"/>
+                </a:solidFill>
+                <a:latin typeface="Arial" panose="020B0604020202020204" pitchFamily="34" charset="0"/>
+                <a:cs typeface="Arial" panose="020B0604020202020204" pitchFamily="34" charset="0"/>
+              </a:rPr>
+              <a:t>increaseIndexGetCurrentCallbackFunction</a:t>
+            </a:r>
+            <a:endParaRPr lang="en-US" sz="1000" b="1" dirty="0">
+              <a:solidFill>
+                <a:schemeClr val="tx1"/>
+              </a:solidFill>
+              <a:latin typeface="Arial" panose="020B0604020202020204" pitchFamily="34" charset="0"/>
+              <a:cs typeface="Arial" panose="020B0604020202020204" pitchFamily="34" charset="0"/>
+            </a:endParaRPr>
+          </a:p>
+          <a:p>
+            <a:endParaRPr lang="en-US" sz="1000" b="1" dirty="0">
+              <a:solidFill>
+                <a:schemeClr val="tx1"/>
+              </a:solidFill>
+              <a:latin typeface="Arial" panose="020B0604020202020204" pitchFamily="34" charset="0"/>
+              <a:cs typeface="Arial" panose="020B0604020202020204" pitchFamily="34" charset="0"/>
+            </a:endParaRPr>
+          </a:p>
+        </p:txBody>
+      </p:sp>
+      <p:sp>
+        <p:nvSpPr>
+          <p:cNvPr id="27" name="Rechteck 26">
+            <a:extLst>
+              <a:ext uri="{FF2B5EF4-FFF2-40B4-BE49-F238E27FC236}">
+                <a16:creationId xmlns:a16="http://schemas.microsoft.com/office/drawing/2014/main" id="{21C46C3D-8C58-C990-290D-FDB770D6DEDE}"/>
+              </a:ext>
+            </a:extLst>
+          </p:cNvPr>
+          <p:cNvSpPr/>
+          <p:nvPr/>
+        </p:nvSpPr>
+        <p:spPr>
+          <a:xfrm>
+            <a:off x="3924251" y="3433195"/>
+            <a:ext cx="2391435" cy="433599"/>
+          </a:xfrm>
+          <a:prstGeom prst="rect">
+            <a:avLst/>
+          </a:prstGeom>
+          <a:noFill/>
+          <a:ln w="19050">
+            <a:solidFill>
+              <a:schemeClr val="tx1"/>
+            </a:solidFill>
+          </a:ln>
+        </p:spPr>
+        <p:style>
+          <a:lnRef idx="2">
+            <a:schemeClr val="accent1">
+              <a:shade val="50000"/>
+            </a:schemeClr>
+          </a:lnRef>
+          <a:fillRef idx="1">
+            <a:schemeClr val="accent1"/>
+          </a:fillRef>
+          <a:effectRef idx="0">
+            <a:schemeClr val="accent1"/>
+          </a:effectRef>
+          <a:fontRef idx="minor">
+            <a:schemeClr val="lt1"/>
+          </a:fontRef>
+        </p:style>
+        <p:txBody>
+          <a:bodyPr rtlCol="0" anchor="ctr"/>
+          <a:lstStyle/>
+          <a:p>
+            <a:pPr algn="ctr"/>
+            <a:r>
+              <a:rPr lang="de-CH" sz="1400" b="1" dirty="0" err="1">
+                <a:solidFill>
+                  <a:schemeClr val="tx1"/>
+                </a:solidFill>
+                <a:latin typeface="Arial" panose="020B0604020202020204" pitchFamily="34" charset="0"/>
+                <a:cs typeface="Arial" panose="020B0604020202020204" pitchFamily="34" charset="0"/>
+              </a:rPr>
+              <a:t>UtilFiles</a:t>
+            </a:r>
+            <a:r>
+              <a:rPr lang="de-CH" sz="1600" dirty="0">
+                <a:solidFill>
+                  <a:schemeClr val="tx1"/>
+                </a:solidFill>
+                <a:latin typeface="Arial" panose="020B0604020202020204" pitchFamily="34" charset="0"/>
+                <a:cs typeface="Arial" panose="020B0604020202020204" pitchFamily="34" charset="0"/>
+              </a:rPr>
+              <a:t> </a:t>
+            </a:r>
+          </a:p>
+          <a:p>
+            <a:pPr algn="ctr"/>
+            <a:r>
+              <a:rPr lang="de-CH" sz="1200" dirty="0" err="1">
+                <a:solidFill>
+                  <a:schemeClr val="tx1"/>
+                </a:solidFill>
+                <a:latin typeface="Arial" panose="020B0604020202020204" pitchFamily="34" charset="0"/>
+                <a:cs typeface="Arial" panose="020B0604020202020204" pitchFamily="34" charset="0"/>
+              </a:rPr>
+              <a:t>Based</a:t>
+            </a:r>
+            <a:r>
+              <a:rPr lang="de-CH" sz="1200" dirty="0">
+                <a:solidFill>
+                  <a:schemeClr val="tx1"/>
+                </a:solidFill>
+                <a:latin typeface="Arial" panose="020B0604020202020204" pitchFamily="34" charset="0"/>
+                <a:cs typeface="Arial" panose="020B0604020202020204" pitchFamily="34" charset="0"/>
+              </a:rPr>
+              <a:t> on </a:t>
+            </a:r>
+            <a:r>
+              <a:rPr lang="de-CH" sz="1200" dirty="0" err="1">
+                <a:solidFill>
+                  <a:schemeClr val="tx1"/>
+                </a:solidFill>
+                <a:latin typeface="Arial" panose="020B0604020202020204" pitchFamily="34" charset="0"/>
+                <a:cs typeface="Arial" panose="020B0604020202020204" pitchFamily="34" charset="0"/>
+              </a:rPr>
+              <a:t>JQuery</a:t>
+            </a:r>
+            <a:r>
+              <a:rPr lang="de-CH" sz="1200" dirty="0">
+                <a:solidFill>
+                  <a:schemeClr val="tx1"/>
+                </a:solidFill>
+                <a:latin typeface="Arial" panose="020B0604020202020204" pitchFamily="34" charset="0"/>
+                <a:cs typeface="Arial" panose="020B0604020202020204" pitchFamily="34" charset="0"/>
+              </a:rPr>
+              <a:t> </a:t>
+            </a:r>
+            <a:r>
+              <a:rPr lang="de-CH" sz="1200" dirty="0" err="1">
+                <a:solidFill>
+                  <a:schemeClr val="tx1"/>
+                </a:solidFill>
+                <a:latin typeface="Arial" panose="020B0604020202020204" pitchFamily="34" charset="0"/>
+                <a:cs typeface="Arial" panose="020B0604020202020204" pitchFamily="34" charset="0"/>
+              </a:rPr>
+              <a:t>post</a:t>
+            </a:r>
+            <a:r>
+              <a:rPr lang="de-CH" sz="1200" dirty="0">
+                <a:solidFill>
+                  <a:schemeClr val="tx1"/>
+                </a:solidFill>
+                <a:latin typeface="Arial" panose="020B0604020202020204" pitchFamily="34" charset="0"/>
+                <a:cs typeface="Arial" panose="020B0604020202020204" pitchFamily="34" charset="0"/>
+              </a:rPr>
+              <a:t>    </a:t>
+            </a:r>
+          </a:p>
+        </p:txBody>
+      </p:sp>
+      <p:sp>
+        <p:nvSpPr>
+          <p:cNvPr id="28" name="Rechteck 27">
+            <a:extLst>
+              <a:ext uri="{FF2B5EF4-FFF2-40B4-BE49-F238E27FC236}">
+                <a16:creationId xmlns:a16="http://schemas.microsoft.com/office/drawing/2014/main" id="{9FC8B246-8634-1F2E-86D7-D171FE8B11D0}"/>
+              </a:ext>
+            </a:extLst>
+          </p:cNvPr>
+          <p:cNvSpPr/>
+          <p:nvPr/>
+        </p:nvSpPr>
+        <p:spPr>
+          <a:xfrm>
+            <a:off x="3924248" y="3866794"/>
+            <a:ext cx="2391435" cy="666888"/>
+          </a:xfrm>
+          <a:prstGeom prst="rect">
+            <a:avLst/>
+          </a:prstGeom>
+          <a:noFill/>
+          <a:ln w="19050">
+            <a:solidFill>
+              <a:schemeClr val="tx1"/>
+            </a:solidFill>
+          </a:ln>
+        </p:spPr>
+        <p:style>
+          <a:lnRef idx="2">
+            <a:schemeClr val="accent1">
+              <a:shade val="50000"/>
+            </a:schemeClr>
+          </a:lnRef>
+          <a:fillRef idx="1">
+            <a:schemeClr val="accent1"/>
+          </a:fillRef>
+          <a:effectRef idx="0">
+            <a:schemeClr val="accent1"/>
+          </a:effectRef>
+          <a:fontRef idx="minor">
+            <a:schemeClr val="lt1"/>
+          </a:fontRef>
+        </p:style>
+        <p:txBody>
+          <a:bodyPr rtlCol="0" anchor="ctr"/>
+          <a:lstStyle/>
+          <a:p>
+            <a:endParaRPr lang="en-US" sz="1000" b="1" dirty="0">
+              <a:solidFill>
+                <a:schemeClr val="tx1"/>
+              </a:solidFill>
+              <a:latin typeface="Arial" panose="020B0604020202020204" pitchFamily="34" charset="0"/>
+              <a:cs typeface="Arial" panose="020B0604020202020204" pitchFamily="34" charset="0"/>
+            </a:endParaRPr>
+          </a:p>
+          <a:p>
+            <a:r>
+              <a:rPr lang="en-US" sz="1200" dirty="0">
+                <a:solidFill>
+                  <a:schemeClr val="tx1"/>
+                </a:solidFill>
+                <a:latin typeface="Arial" panose="020B0604020202020204" pitchFamily="34" charset="0"/>
+                <a:cs typeface="Arial" panose="020B0604020202020204" pitchFamily="34" charset="0"/>
+              </a:rPr>
+              <a:t>Member functions (static)</a:t>
+            </a:r>
+          </a:p>
+          <a:p>
+            <a:r>
+              <a:rPr lang="de-CH" sz="1000" b="1" dirty="0" err="1">
+                <a:solidFill>
+                  <a:schemeClr val="tx1"/>
+                </a:solidFill>
+                <a:latin typeface="Arial" panose="020B0604020202020204" pitchFamily="34" charset="0"/>
+                <a:cs typeface="Arial" panose="020B0604020202020204" pitchFamily="34" charset="0"/>
+              </a:rPr>
+              <a:t>dirFileAnyCase</a:t>
+            </a:r>
+            <a:r>
+              <a:rPr lang="de-CH" sz="1000" b="1" dirty="0">
+                <a:solidFill>
+                  <a:schemeClr val="tx1"/>
+                </a:solidFill>
+                <a:latin typeface="Arial" panose="020B0604020202020204" pitchFamily="34" charset="0"/>
+                <a:cs typeface="Arial" panose="020B0604020202020204" pitchFamily="34" charset="0"/>
+              </a:rPr>
+              <a:t>(</a:t>
+            </a:r>
+            <a:r>
+              <a:rPr lang="de-CH" sz="1000" b="1" dirty="0" err="1">
+                <a:solidFill>
+                  <a:schemeClr val="tx1"/>
+                </a:solidFill>
+                <a:latin typeface="Arial" panose="020B0604020202020204" pitchFamily="34" charset="0"/>
+                <a:cs typeface="Arial" panose="020B0604020202020204" pitchFamily="34" charset="0"/>
+              </a:rPr>
+              <a:t>object</a:t>
+            </a:r>
+            <a:r>
+              <a:rPr lang="de-CH" sz="1000" b="1" dirty="0">
+                <a:solidFill>
+                  <a:schemeClr val="tx1"/>
+                </a:solidFill>
+                <a:latin typeface="Arial" panose="020B0604020202020204" pitchFamily="34" charset="0"/>
+                <a:cs typeface="Arial" panose="020B0604020202020204" pitchFamily="34" charset="0"/>
+              </a:rPr>
+              <a:t> </a:t>
+            </a:r>
+            <a:r>
+              <a:rPr lang="de-CH" sz="1000" b="1" dirty="0" err="1">
+                <a:solidFill>
+                  <a:schemeClr val="tx1"/>
+                </a:solidFill>
+                <a:latin typeface="Arial" panose="020B0604020202020204" pitchFamily="34" charset="0"/>
+                <a:cs typeface="Arial" panose="020B0604020202020204" pitchFamily="34" charset="0"/>
+              </a:rPr>
+              <a:t>UtilFilesData</a:t>
+            </a:r>
+            <a:r>
+              <a:rPr lang="de-CH" sz="1000" b="1" dirty="0">
+                <a:solidFill>
+                  <a:schemeClr val="tx1"/>
+                </a:solidFill>
+                <a:latin typeface="Arial" panose="020B0604020202020204" pitchFamily="34" charset="0"/>
+                <a:cs typeface="Arial" panose="020B0604020202020204" pitchFamily="34" charset="0"/>
+              </a:rPr>
+              <a:t>)</a:t>
+            </a:r>
+          </a:p>
+          <a:p>
+            <a:r>
+              <a:rPr lang="de-CH" sz="1000" b="1" dirty="0" err="1">
+                <a:solidFill>
+                  <a:schemeClr val="tx1"/>
+                </a:solidFill>
+                <a:latin typeface="Arial" panose="020B0604020202020204" pitchFamily="34" charset="0"/>
+                <a:cs typeface="Arial" panose="020B0604020202020204" pitchFamily="34" charset="0"/>
+              </a:rPr>
+              <a:t>getDirFileNames</a:t>
+            </a:r>
+            <a:endParaRPr lang="de-CH" sz="1000" b="1" dirty="0">
+              <a:solidFill>
+                <a:schemeClr val="tx1"/>
+              </a:solidFill>
+              <a:latin typeface="Arial" panose="020B0604020202020204" pitchFamily="34" charset="0"/>
+              <a:cs typeface="Arial" panose="020B0604020202020204" pitchFamily="34" charset="0"/>
+            </a:endParaRPr>
+          </a:p>
+          <a:p>
+            <a:endParaRPr lang="de-CH" sz="1000" b="1" dirty="0">
+              <a:solidFill>
+                <a:schemeClr val="tx1"/>
+              </a:solidFill>
+              <a:latin typeface="Arial" panose="020B0604020202020204" pitchFamily="34" charset="0"/>
+              <a:cs typeface="Arial" panose="020B0604020202020204" pitchFamily="34" charset="0"/>
+            </a:endParaRPr>
+          </a:p>
+        </p:txBody>
+      </p:sp>
+      <p:sp>
+        <p:nvSpPr>
+          <p:cNvPr id="29" name="Rechteck 28">
+            <a:extLst>
+              <a:ext uri="{FF2B5EF4-FFF2-40B4-BE49-F238E27FC236}">
+                <a16:creationId xmlns:a16="http://schemas.microsoft.com/office/drawing/2014/main" id="{0EB5B2A0-BB9E-58A7-E08C-73758420334D}"/>
+              </a:ext>
+            </a:extLst>
+          </p:cNvPr>
+          <p:cNvSpPr/>
+          <p:nvPr/>
+        </p:nvSpPr>
+        <p:spPr>
+          <a:xfrm>
+            <a:off x="3905394" y="5026007"/>
+            <a:ext cx="2391435" cy="570469"/>
+          </a:xfrm>
+          <a:prstGeom prst="rect">
+            <a:avLst/>
+          </a:prstGeom>
+          <a:noFill/>
+          <a:ln w="19050">
+            <a:solidFill>
+              <a:schemeClr val="tx1"/>
+            </a:solidFill>
+            <a:prstDash val="solid"/>
+          </a:ln>
+        </p:spPr>
+        <p:style>
+          <a:lnRef idx="2">
+            <a:schemeClr val="accent1">
+              <a:shade val="50000"/>
+            </a:schemeClr>
+          </a:lnRef>
+          <a:fillRef idx="1">
+            <a:schemeClr val="accent1"/>
+          </a:fillRef>
+          <a:effectRef idx="0">
+            <a:schemeClr val="accent1"/>
+          </a:effectRef>
+          <a:fontRef idx="minor">
+            <a:schemeClr val="lt1"/>
+          </a:fontRef>
+        </p:style>
+        <p:txBody>
+          <a:bodyPr rtlCol="0" anchor="ctr"/>
+          <a:lstStyle/>
+          <a:p>
+            <a:r>
+              <a:rPr lang="de-CH" sz="1000" b="1" dirty="0">
+                <a:solidFill>
+                  <a:schemeClr val="tx1"/>
+                </a:solidFill>
+                <a:latin typeface="Arial" panose="020B0604020202020204" pitchFamily="34" charset="0"/>
+                <a:cs typeface="Arial" panose="020B0604020202020204" pitchFamily="34" charset="0"/>
+              </a:rPr>
+              <a:t>…, </a:t>
+            </a:r>
+            <a:r>
+              <a:rPr lang="de-CH" sz="1000" b="1" dirty="0" err="1">
+                <a:solidFill>
+                  <a:schemeClr val="tx1"/>
+                </a:solidFill>
+                <a:latin typeface="Arial" panose="020B0604020202020204" pitchFamily="34" charset="0"/>
+                <a:cs typeface="Arial" panose="020B0604020202020204" pitchFamily="34" charset="0"/>
+              </a:rPr>
+              <a:t>dirListXml</a:t>
+            </a:r>
+            <a:r>
+              <a:rPr lang="de-CH" sz="1000" b="1" dirty="0">
+                <a:solidFill>
+                  <a:schemeClr val="tx1"/>
+                </a:solidFill>
+                <a:latin typeface="Arial" panose="020B0604020202020204" pitchFamily="34" charset="0"/>
+                <a:cs typeface="Arial" panose="020B0604020202020204" pitchFamily="34" charset="0"/>
+              </a:rPr>
+              <a:t>, …</a:t>
+            </a:r>
+          </a:p>
+        </p:txBody>
+      </p:sp>
+      <p:sp>
+        <p:nvSpPr>
+          <p:cNvPr id="30" name="Rechteck 29">
+            <a:extLst>
+              <a:ext uri="{FF2B5EF4-FFF2-40B4-BE49-F238E27FC236}">
+                <a16:creationId xmlns:a16="http://schemas.microsoft.com/office/drawing/2014/main" id="{4342B53D-85C8-BA02-2E2D-9CB64EAE1356}"/>
+              </a:ext>
+            </a:extLst>
+          </p:cNvPr>
+          <p:cNvSpPr/>
+          <p:nvPr/>
+        </p:nvSpPr>
+        <p:spPr>
+          <a:xfrm>
+            <a:off x="3905394" y="4588829"/>
+            <a:ext cx="2391435" cy="437178"/>
+          </a:xfrm>
+          <a:prstGeom prst="rect">
+            <a:avLst/>
+          </a:prstGeom>
+          <a:noFill/>
+          <a:ln w="19050">
+            <a:solidFill>
+              <a:schemeClr val="tx1"/>
+            </a:solidFill>
+          </a:ln>
+        </p:spPr>
+        <p:style>
+          <a:lnRef idx="2">
+            <a:schemeClr val="accent1">
+              <a:shade val="50000"/>
+            </a:schemeClr>
+          </a:lnRef>
+          <a:fillRef idx="1">
+            <a:schemeClr val="accent1"/>
+          </a:fillRef>
+          <a:effectRef idx="0">
+            <a:schemeClr val="accent1"/>
+          </a:effectRef>
+          <a:fontRef idx="minor">
+            <a:schemeClr val="lt1"/>
+          </a:fontRef>
+        </p:style>
+        <p:txBody>
+          <a:bodyPr rtlCol="0" anchor="ctr"/>
+          <a:lstStyle/>
+          <a:p>
+            <a:pPr algn="ctr"/>
+            <a:r>
+              <a:rPr lang="de-CH" sz="1400" b="1" dirty="0" err="1">
+                <a:solidFill>
+                  <a:schemeClr val="tx1"/>
+                </a:solidFill>
+                <a:latin typeface="Arial" panose="020B0604020202020204" pitchFamily="34" charset="0"/>
+                <a:cs typeface="Arial" panose="020B0604020202020204" pitchFamily="34" charset="0"/>
+              </a:rPr>
+              <a:t>UtilFiles.php</a:t>
+            </a:r>
+            <a:r>
+              <a:rPr lang="de-CH" sz="1400" dirty="0">
+                <a:solidFill>
+                  <a:schemeClr val="tx1"/>
+                </a:solidFill>
+                <a:latin typeface="Arial" panose="020B0604020202020204" pitchFamily="34" charset="0"/>
+                <a:cs typeface="Arial" panose="020B0604020202020204" pitchFamily="34" charset="0"/>
+              </a:rPr>
+              <a:t> </a:t>
+            </a:r>
+          </a:p>
+          <a:p>
+            <a:pPr algn="ctr"/>
+            <a:r>
+              <a:rPr lang="de-CH" sz="1200" dirty="0">
+                <a:solidFill>
+                  <a:schemeClr val="tx1"/>
+                </a:solidFill>
+                <a:latin typeface="Arial" panose="020B0604020202020204" pitchFamily="34" charset="0"/>
+                <a:cs typeface="Arial" panose="020B0604020202020204" pitchFamily="34" charset="0"/>
+              </a:rPr>
+              <a:t>PHP </a:t>
+            </a:r>
+            <a:r>
+              <a:rPr lang="de-CH" sz="1200" dirty="0" err="1">
+                <a:solidFill>
+                  <a:schemeClr val="tx1"/>
+                </a:solidFill>
+                <a:latin typeface="Arial" panose="020B0604020202020204" pitchFamily="34" charset="0"/>
+                <a:cs typeface="Arial" panose="020B0604020202020204" pitchFamily="34" charset="0"/>
+              </a:rPr>
+              <a:t>file</a:t>
+            </a:r>
+            <a:r>
+              <a:rPr lang="de-CH" sz="1200" dirty="0">
+                <a:solidFill>
+                  <a:schemeClr val="tx1"/>
+                </a:solidFill>
+                <a:latin typeface="Arial" panose="020B0604020202020204" pitchFamily="34" charset="0"/>
+                <a:cs typeface="Arial" panose="020B0604020202020204" pitchFamily="34" charset="0"/>
+              </a:rPr>
+              <a:t> </a:t>
+            </a:r>
+            <a:r>
+              <a:rPr lang="de-CH" sz="1200" dirty="0" err="1">
+                <a:solidFill>
+                  <a:schemeClr val="tx1"/>
+                </a:solidFill>
+                <a:latin typeface="Arial" panose="020B0604020202020204" pitchFamily="34" charset="0"/>
+                <a:cs typeface="Arial" panose="020B0604020202020204" pitchFamily="34" charset="0"/>
+              </a:rPr>
+              <a:t>functions</a:t>
+            </a:r>
+            <a:endParaRPr lang="de-CH" sz="1200" dirty="0">
+              <a:solidFill>
+                <a:schemeClr val="tx1"/>
+              </a:solidFill>
+              <a:latin typeface="Arial" panose="020B0604020202020204" pitchFamily="34" charset="0"/>
+              <a:cs typeface="Arial" panose="020B0604020202020204" pitchFamily="34" charset="0"/>
+            </a:endParaRPr>
+          </a:p>
+        </p:txBody>
+      </p:sp>
+      <p:sp>
+        <p:nvSpPr>
+          <p:cNvPr id="31" name="Rechteck 30">
+            <a:extLst>
+              <a:ext uri="{FF2B5EF4-FFF2-40B4-BE49-F238E27FC236}">
+                <a16:creationId xmlns:a16="http://schemas.microsoft.com/office/drawing/2014/main" id="{86A30F49-376D-90D3-21B9-73354C5CBC42}"/>
+              </a:ext>
+            </a:extLst>
+          </p:cNvPr>
+          <p:cNvSpPr/>
+          <p:nvPr/>
+        </p:nvSpPr>
+        <p:spPr>
+          <a:xfrm>
+            <a:off x="3777895" y="2346485"/>
+            <a:ext cx="2724345" cy="666888"/>
+          </a:xfrm>
+          <a:prstGeom prst="rect">
+            <a:avLst/>
+          </a:prstGeom>
+          <a:noFill/>
+          <a:ln w="19050">
+            <a:solidFill>
+              <a:schemeClr val="tx1"/>
+            </a:solidFill>
+          </a:ln>
+        </p:spPr>
+        <p:style>
+          <a:lnRef idx="2">
+            <a:schemeClr val="accent1">
+              <a:shade val="50000"/>
+            </a:schemeClr>
+          </a:lnRef>
+          <a:fillRef idx="1">
+            <a:schemeClr val="accent1"/>
+          </a:fillRef>
+          <a:effectRef idx="0">
+            <a:schemeClr val="accent1"/>
+          </a:effectRef>
+          <a:fontRef idx="minor">
+            <a:schemeClr val="lt1"/>
+          </a:fontRef>
+        </p:style>
+        <p:txBody>
+          <a:bodyPr rtlCol="0" anchor="ctr"/>
+          <a:lstStyle/>
+          <a:p>
+            <a:pPr algn="ctr"/>
+            <a:r>
+              <a:rPr lang="en-US" sz="900" b="1" dirty="0">
+                <a:solidFill>
+                  <a:schemeClr val="tx1"/>
+                </a:solidFill>
+                <a:latin typeface="Arial" panose="020B0604020202020204" pitchFamily="34" charset="0"/>
+                <a:cs typeface="Arial" panose="020B0604020202020204" pitchFamily="34" charset="0"/>
+              </a:rPr>
+              <a:t>Create the output array and call the input callback function with the array as argument </a:t>
+            </a:r>
+          </a:p>
+          <a:p>
+            <a:pPr algn="ctr"/>
+            <a:r>
+              <a:rPr lang="en-US" sz="900" b="1" dirty="0">
+                <a:solidFill>
+                  <a:schemeClr val="tx1"/>
+                </a:solidFill>
+                <a:latin typeface="Arial" panose="020B0604020202020204" pitchFamily="34" charset="0"/>
+                <a:cs typeface="Arial" panose="020B0604020202020204" pitchFamily="34" charset="0"/>
+              </a:rPr>
+              <a:t> </a:t>
+            </a:r>
+            <a:r>
+              <a:rPr lang="en-US" sz="900" b="1" dirty="0" err="1">
+                <a:solidFill>
+                  <a:schemeClr val="tx1"/>
+                </a:solidFill>
+                <a:latin typeface="Arial" panose="020B0604020202020204" pitchFamily="34" charset="0"/>
+                <a:cs typeface="Arial" panose="020B0604020202020204" pitchFamily="34" charset="0"/>
+              </a:rPr>
+              <a:t>UtilFiles.getDirScanArray</a:t>
+            </a:r>
+            <a:endParaRPr lang="en-US" sz="900" b="1" dirty="0">
+              <a:solidFill>
+                <a:schemeClr val="tx1"/>
+              </a:solidFill>
+              <a:latin typeface="Arial" panose="020B0604020202020204" pitchFamily="34" charset="0"/>
+              <a:cs typeface="Arial" panose="020B0604020202020204" pitchFamily="34" charset="0"/>
+            </a:endParaRPr>
+          </a:p>
+        </p:txBody>
+      </p:sp>
+      <p:cxnSp>
+        <p:nvCxnSpPr>
+          <p:cNvPr id="32" name="Gerader Verbinder 31">
+            <a:extLst>
+              <a:ext uri="{FF2B5EF4-FFF2-40B4-BE49-F238E27FC236}">
+                <a16:creationId xmlns:a16="http://schemas.microsoft.com/office/drawing/2014/main" id="{108C3D4C-F330-F23C-3165-37E7BEC76821}"/>
+              </a:ext>
+            </a:extLst>
+          </p:cNvPr>
+          <p:cNvCxnSpPr/>
+          <p:nvPr/>
+        </p:nvCxnSpPr>
+        <p:spPr>
+          <a:xfrm flipH="1">
+            <a:off x="5119969" y="2083847"/>
+            <a:ext cx="9427" cy="269824"/>
+          </a:xfrm>
+          <a:prstGeom prst="line">
+            <a:avLst/>
+          </a:prstGeom>
+          <a:ln w="19050">
+            <a:solidFill>
+              <a:schemeClr val="tx1"/>
+            </a:solidFill>
+          </a:ln>
+        </p:spPr>
+        <p:style>
+          <a:lnRef idx="1">
+            <a:schemeClr val="accent1"/>
+          </a:lnRef>
+          <a:fillRef idx="0">
+            <a:schemeClr val="accent1"/>
+          </a:fillRef>
+          <a:effectRef idx="0">
+            <a:schemeClr val="accent1"/>
+          </a:effectRef>
+          <a:fontRef idx="minor">
+            <a:schemeClr val="tx1"/>
+          </a:fontRef>
+        </p:style>
+      </p:cxnSp>
     </p:spTree>
     <p:extLst>
       <p:ext uri="{BB962C8B-B14F-4D97-AF65-F5344CB8AC3E}">

</xml_diff>